<commit_message>
update images content and dropdown menu
</commit_message>
<xml_diff>
--- a/images/Images.pptx
+++ b/images/Images.pptx
@@ -10,6 +10,7 @@
     <p:sldId id="258" r:id="rId4"/>
     <p:sldId id="259" r:id="rId5"/>
     <p:sldId id="260" r:id="rId6"/>
+    <p:sldId id="261" r:id="rId7"/>
   </p:sldIdLst>
   <p:sldSz cx="12192000" cy="6858000"/>
   <p:notesSz cx="6858000" cy="9144000"/>
@@ -265,7 +266,7 @@
           <a:p>
             <a:fld id="{7D852363-8AC4-9444-976A-AAFF1693DDBA}" type="datetimeFigureOut">
               <a:rPr lang="en-US" smtClean="0"/>
-              <a:t>6/19/24</a:t>
+              <a:t>6/21/24</a:t>
             </a:fld>
             <a:endParaRPr lang="en-US"/>
           </a:p>
@@ -465,7 +466,7 @@
           <a:p>
             <a:fld id="{7D852363-8AC4-9444-976A-AAFF1693DDBA}" type="datetimeFigureOut">
               <a:rPr lang="en-US" smtClean="0"/>
-              <a:t>6/19/24</a:t>
+              <a:t>6/21/24</a:t>
             </a:fld>
             <a:endParaRPr lang="en-US"/>
           </a:p>
@@ -675,7 +676,7 @@
           <a:p>
             <a:fld id="{7D852363-8AC4-9444-976A-AAFF1693DDBA}" type="datetimeFigureOut">
               <a:rPr lang="en-US" smtClean="0"/>
-              <a:t>6/19/24</a:t>
+              <a:t>6/21/24</a:t>
             </a:fld>
             <a:endParaRPr lang="en-US"/>
           </a:p>
@@ -875,7 +876,7 @@
           <a:p>
             <a:fld id="{7D852363-8AC4-9444-976A-AAFF1693DDBA}" type="datetimeFigureOut">
               <a:rPr lang="en-US" smtClean="0"/>
-              <a:t>6/19/24</a:t>
+              <a:t>6/21/24</a:t>
             </a:fld>
             <a:endParaRPr lang="en-US"/>
           </a:p>
@@ -1151,7 +1152,7 @@
           <a:p>
             <a:fld id="{7D852363-8AC4-9444-976A-AAFF1693DDBA}" type="datetimeFigureOut">
               <a:rPr lang="en-US" smtClean="0"/>
-              <a:t>6/19/24</a:t>
+              <a:t>6/21/24</a:t>
             </a:fld>
             <a:endParaRPr lang="en-US"/>
           </a:p>
@@ -1419,7 +1420,7 @@
           <a:p>
             <a:fld id="{7D852363-8AC4-9444-976A-AAFF1693DDBA}" type="datetimeFigureOut">
               <a:rPr lang="en-US" smtClean="0"/>
-              <a:t>6/19/24</a:t>
+              <a:t>6/21/24</a:t>
             </a:fld>
             <a:endParaRPr lang="en-US"/>
           </a:p>
@@ -1834,7 +1835,7 @@
           <a:p>
             <a:fld id="{7D852363-8AC4-9444-976A-AAFF1693DDBA}" type="datetimeFigureOut">
               <a:rPr lang="en-US" smtClean="0"/>
-              <a:t>6/19/24</a:t>
+              <a:t>6/21/24</a:t>
             </a:fld>
             <a:endParaRPr lang="en-US"/>
           </a:p>
@@ -1976,7 +1977,7 @@
           <a:p>
             <a:fld id="{7D852363-8AC4-9444-976A-AAFF1693DDBA}" type="datetimeFigureOut">
               <a:rPr lang="en-US" smtClean="0"/>
-              <a:t>6/19/24</a:t>
+              <a:t>6/21/24</a:t>
             </a:fld>
             <a:endParaRPr lang="en-US"/>
           </a:p>
@@ -2089,7 +2090,7 @@
           <a:p>
             <a:fld id="{7D852363-8AC4-9444-976A-AAFF1693DDBA}" type="datetimeFigureOut">
               <a:rPr lang="en-US" smtClean="0"/>
-              <a:t>6/19/24</a:t>
+              <a:t>6/21/24</a:t>
             </a:fld>
             <a:endParaRPr lang="en-US"/>
           </a:p>
@@ -2402,7 +2403,7 @@
           <a:p>
             <a:fld id="{7D852363-8AC4-9444-976A-AAFF1693DDBA}" type="datetimeFigureOut">
               <a:rPr lang="en-US" smtClean="0"/>
-              <a:t>6/19/24</a:t>
+              <a:t>6/21/24</a:t>
             </a:fld>
             <a:endParaRPr lang="en-US"/>
           </a:p>
@@ -2691,7 +2692,7 @@
           <a:p>
             <a:fld id="{7D852363-8AC4-9444-976A-AAFF1693DDBA}" type="datetimeFigureOut">
               <a:rPr lang="en-US" smtClean="0"/>
-              <a:t>6/19/24</a:t>
+              <a:t>6/21/24</a:t>
             </a:fld>
             <a:endParaRPr lang="en-US"/>
           </a:p>
@@ -2934,7 +2935,7 @@
           <a:p>
             <a:fld id="{7D852363-8AC4-9444-976A-AAFF1693DDBA}" type="datetimeFigureOut">
               <a:rPr lang="en-US" smtClean="0"/>
-              <a:t>6/19/24</a:t>
+              <a:t>6/21/24</a:t>
             </a:fld>
             <a:endParaRPr lang="en-US"/>
           </a:p>
@@ -4755,6 +4756,66 @@
 </p:sld>
 </file>
 
+<file path=ppt/slides/slide6.xml><?xml version="1.0" encoding="utf-8"?>
+<p:sld xmlns:a="http://schemas.openxmlformats.org/drawingml/2006/main" xmlns:r="http://schemas.openxmlformats.org/officeDocument/2006/relationships" xmlns:p="http://schemas.openxmlformats.org/presentationml/2006/main">
+  <p:cSld>
+    <p:spTree>
+      <p:nvGrpSpPr>
+        <p:cNvPr id="1" name=""/>
+        <p:cNvGrpSpPr/>
+        <p:nvPr/>
+      </p:nvGrpSpPr>
+      <p:grpSpPr>
+        <a:xfrm>
+          <a:off x="0" y="0"/>
+          <a:ext cx="0" cy="0"/>
+          <a:chOff x="0" y="0"/>
+          <a:chExt cx="0" cy="0"/>
+        </a:xfrm>
+      </p:grpSpPr>
+      <p:pic>
+        <p:nvPicPr>
+          <p:cNvPr id="3" name="Picture 2">
+            <a:extLst>
+              <a:ext uri="{FF2B5EF4-FFF2-40B4-BE49-F238E27FC236}">
+                <a16:creationId xmlns:a16="http://schemas.microsoft.com/office/drawing/2014/main" id="{1408CD9F-62F1-AD4F-9F32-FAB1BE071273}"/>
+              </a:ext>
+            </a:extLst>
+          </p:cNvPr>
+          <p:cNvPicPr>
+            <a:picLocks noChangeAspect="1"/>
+          </p:cNvPicPr>
+          <p:nvPr/>
+        </p:nvPicPr>
+        <p:blipFill>
+          <a:blip r:embed="rId2"/>
+          <a:stretch>
+            <a:fillRect/>
+          </a:stretch>
+        </p:blipFill>
+        <p:spPr>
+          <a:xfrm>
+            <a:off x="8645889" y="994515"/>
+            <a:ext cx="3905149" cy="3635829"/>
+          </a:xfrm>
+          <a:prstGeom prst="rect">
+            <a:avLst/>
+          </a:prstGeom>
+        </p:spPr>
+      </p:pic>
+    </p:spTree>
+    <p:extLst>
+      <p:ext uri="{BB962C8B-B14F-4D97-AF65-F5344CB8AC3E}">
+        <p14:creationId xmlns:p14="http://schemas.microsoft.com/office/powerpoint/2010/main" val="404324608"/>
+      </p:ext>
+    </p:extLst>
+  </p:cSld>
+  <p:clrMapOvr>
+    <a:masterClrMapping/>
+  </p:clrMapOvr>
+</p:sld>
+</file>
+
 <file path=ppt/theme/theme1.xml><?xml version="1.0" encoding="utf-8"?>
 <a:theme xmlns:a="http://schemas.openxmlformats.org/drawingml/2006/main" name="Office Theme">
   <a:themeElements>

</xml_diff>